<commit_message>
Wee. Using git like dropbox ftw
</commit_message>
<xml_diff>
--- a/Prototype presentation.pptx
+++ b/Prototype presentation.pptx
@@ -389,6 +389,7 @@
           <a:p>
             <a:fld id="{8B25D5C8-0496-4B15-97A0-F3DDC44B0782}" type="datetimeFigureOut">
               <a:rPr lang="en-US" smtClean="0"/>
+              <a:pPr/>
               <a:t>9/12/2012</a:t>
             </a:fld>
             <a:endParaRPr lang="en-US"/>
@@ -618,6 +619,7 @@
           <a:p>
             <a:fld id="{C9D9E7C4-77AB-41A9-9040-016F4E78D578}" type="slidenum">
               <a:rPr lang="en-US" smtClean="0"/>
+              <a:pPr/>
               <a:t>‹#›</a:t>
             </a:fld>
             <a:endParaRPr lang="en-US"/>
@@ -782,6 +784,7 @@
           <a:p>
             <a:fld id="{8B25D5C8-0496-4B15-97A0-F3DDC44B0782}" type="datetimeFigureOut">
               <a:rPr lang="en-US" smtClean="0"/>
+              <a:pPr/>
               <a:t>9/12/2012</a:t>
             </a:fld>
             <a:endParaRPr lang="en-US"/>
@@ -824,6 +827,7 @@
           <a:p>
             <a:fld id="{C9D9E7C4-77AB-41A9-9040-016F4E78D578}" type="slidenum">
               <a:rPr lang="en-US" smtClean="0"/>
+              <a:pPr/>
               <a:t>‹#›</a:t>
             </a:fld>
             <a:endParaRPr lang="en-US"/>
@@ -1234,6 +1238,7 @@
           <a:p>
             <a:fld id="{C9D9E7C4-77AB-41A9-9040-016F4E78D578}" type="slidenum">
               <a:rPr lang="en-US" smtClean="0"/>
+              <a:pPr/>
               <a:t>‹#›</a:t>
             </a:fld>
             <a:endParaRPr lang="en-US"/>
@@ -1314,6 +1319,7 @@
           <a:p>
             <a:fld id="{8B25D5C8-0496-4B15-97A0-F3DDC44B0782}" type="datetimeFigureOut">
               <a:rPr lang="en-US" smtClean="0"/>
+              <a:pPr/>
               <a:t>9/12/2012</a:t>
             </a:fld>
             <a:endParaRPr lang="en-US"/>
@@ -1447,6 +1453,7 @@
           <a:p>
             <a:fld id="{8B25D5C8-0496-4B15-97A0-F3DDC44B0782}" type="datetimeFigureOut">
               <a:rPr lang="en-US" smtClean="0"/>
+              <a:pPr/>
               <a:t>9/12/2012</a:t>
             </a:fld>
             <a:endParaRPr lang="en-US"/>
@@ -1494,6 +1501,7 @@
           <a:p>
             <a:fld id="{C9D9E7C4-77AB-41A9-9040-016F4E78D578}" type="slidenum">
               <a:rPr lang="en-US" smtClean="0"/>
+              <a:pPr/>
               <a:t>‹#›</a:t>
             </a:fld>
             <a:endParaRPr lang="en-US"/>
@@ -1990,6 +1998,7 @@
           <a:p>
             <a:fld id="{8B25D5C8-0496-4B15-97A0-F3DDC44B0782}" type="datetimeFigureOut">
               <a:rPr lang="en-US" smtClean="0"/>
+              <a:pPr/>
               <a:t>9/12/2012</a:t>
             </a:fld>
             <a:endParaRPr lang="en-US"/>
@@ -2162,6 +2171,7 @@
           <a:p>
             <a:fld id="{C9D9E7C4-77AB-41A9-9040-016F4E78D578}" type="slidenum">
               <a:rPr lang="en-US" smtClean="0"/>
+              <a:pPr/>
               <a:t>‹#›</a:t>
             </a:fld>
             <a:endParaRPr lang="en-US"/>
@@ -2285,6 +2295,7 @@
           <a:p>
             <a:fld id="{8B25D5C8-0496-4B15-97A0-F3DDC44B0782}" type="datetimeFigureOut">
               <a:rPr lang="en-US" smtClean="0"/>
+              <a:pPr/>
               <a:t>9/12/2012</a:t>
             </a:fld>
             <a:endParaRPr lang="en-US"/>
@@ -2327,6 +2338,7 @@
           <a:p>
             <a:fld id="{C9D9E7C4-77AB-41A9-9040-016F4E78D578}" type="slidenum">
               <a:rPr lang="en-US" smtClean="0"/>
+              <a:pPr/>
               <a:t>‹#›</a:t>
             </a:fld>
             <a:endParaRPr lang="en-US"/>
@@ -2944,6 +2956,7 @@
           <a:p>
             <a:fld id="{8B25D5C8-0496-4B15-97A0-F3DDC44B0782}" type="datetimeFigureOut">
               <a:rPr lang="en-US" smtClean="0"/>
+              <a:pPr/>
               <a:t>9/12/2012</a:t>
             </a:fld>
             <a:endParaRPr lang="en-US"/>
@@ -3286,6 +3299,7 @@
           <a:p>
             <a:fld id="{C9D9E7C4-77AB-41A9-9040-016F4E78D578}" type="slidenum">
               <a:rPr lang="en-US" smtClean="0"/>
+              <a:pPr/>
               <a:t>‹#›</a:t>
             </a:fld>
             <a:endParaRPr lang="en-US"/>
@@ -3380,6 +3394,7 @@
           <a:p>
             <a:fld id="{8B25D5C8-0496-4B15-97A0-F3DDC44B0782}" type="datetimeFigureOut">
               <a:rPr lang="en-US" smtClean="0"/>
+              <a:pPr/>
               <a:t>9/12/2012</a:t>
             </a:fld>
             <a:endParaRPr lang="en-US"/>
@@ -3427,6 +3442,7 @@
           <a:p>
             <a:fld id="{C9D9E7C4-77AB-41A9-9040-016F4E78D578}" type="slidenum">
               <a:rPr lang="en-US" smtClean="0"/>
+              <a:pPr/>
               <a:t>‹#›</a:t>
             </a:fld>
             <a:endParaRPr lang="en-US"/>
@@ -3693,6 +3709,7 @@
           <a:p>
             <a:fld id="{8B25D5C8-0496-4B15-97A0-F3DDC44B0782}" type="datetimeFigureOut">
               <a:rPr lang="en-US" smtClean="0"/>
+              <a:pPr/>
               <a:t>9/12/2012</a:t>
             </a:fld>
             <a:endParaRPr lang="en-US"/>
@@ -3748,6 +3765,7 @@
           <a:p>
             <a:fld id="{C9D9E7C4-77AB-41A9-9040-016F4E78D578}" type="slidenum">
               <a:rPr lang="en-US" smtClean="0"/>
+              <a:pPr/>
               <a:t>‹#›</a:t>
             </a:fld>
             <a:endParaRPr lang="en-US"/>
@@ -4366,6 +4384,7 @@
           <a:p>
             <a:fld id="{C9D9E7C4-77AB-41A9-9040-016F4E78D578}" type="slidenum">
               <a:rPr lang="en-US" smtClean="0"/>
+              <a:pPr/>
               <a:t>‹#›</a:t>
             </a:fld>
             <a:endParaRPr lang="en-US"/>
@@ -4425,6 +4444,7 @@
           <a:p>
             <a:fld id="{8B25D5C8-0496-4B15-97A0-F3DDC44B0782}" type="datetimeFigureOut">
               <a:rPr lang="en-US" smtClean="0"/>
+              <a:pPr/>
               <a:t>9/12/2012</a:t>
             </a:fld>
             <a:endParaRPr lang="en-US"/>
@@ -4900,6 +4920,7 @@
           <a:p>
             <a:fld id="{C9D9E7C4-77AB-41A9-9040-016F4E78D578}" type="slidenum">
               <a:rPr lang="en-US" smtClean="0"/>
+              <a:pPr/>
               <a:t>‹#›</a:t>
             </a:fld>
             <a:endParaRPr lang="en-US"/>
@@ -5089,6 +5110,7 @@
           <a:p>
             <a:fld id="{8B25D5C8-0496-4B15-97A0-F3DDC44B0782}" type="datetimeFigureOut">
               <a:rPr lang="en-US" smtClean="0"/>
+              <a:pPr/>
               <a:t>9/12/2012</a:t>
             </a:fld>
             <a:endParaRPr lang="en-US"/>
@@ -5362,6 +5384,7 @@
           <a:p>
             <a:fld id="{8B25D5C8-0496-4B15-97A0-F3DDC44B0782}" type="datetimeFigureOut">
               <a:rPr lang="en-US" smtClean="0"/>
+              <a:pPr/>
               <a:t>9/12/2012</a:t>
             </a:fld>
             <a:endParaRPr lang="en-US"/>
@@ -5612,6 +5635,7 @@
           <a:p>
             <a:fld id="{C9D9E7C4-77AB-41A9-9040-016F4E78D578}" type="slidenum">
               <a:rPr lang="en-US" smtClean="0"/>
+              <a:pPr/>
               <a:t>‹#›</a:t>
             </a:fld>
             <a:endParaRPr lang="en-US"/>
@@ -6284,8 +6308,13 @@
           <a:p>
             <a:r>
               <a:rPr lang="en-US" dirty="0" smtClean="0"/>
-              <a:t>Entity Framework 4</a:t>
-            </a:r>
+              <a:t>Entity Framework </a:t>
+            </a:r>
+            <a:r>
+              <a:rPr lang="en-US" dirty="0" smtClean="0"/>
+              <a:t>4.2 w/ Code First</a:t>
+            </a:r>
+            <a:endParaRPr lang="en-US" dirty="0" smtClean="0"/>
           </a:p>
           <a:p>
             <a:endParaRPr lang="en-US" dirty="0"/>
@@ -6293,9 +6322,32 @@
           <a:p>
             <a:r>
               <a:rPr lang="en-US" dirty="0" smtClean="0"/>
-              <a:t>MVC 4</a:t>
-            </a:r>
-            <a:endParaRPr lang="en-US" dirty="0"/>
+              <a:t>MVC </a:t>
+            </a:r>
+            <a:r>
+              <a:rPr lang="en-US" dirty="0" smtClean="0"/>
+              <a:t>4</a:t>
+            </a:r>
+            <a:endParaRPr lang="en-US" dirty="0" smtClean="0"/>
+          </a:p>
+          <a:p>
+            <a:endParaRPr lang="en-US" dirty="0" smtClean="0"/>
+          </a:p>
+          <a:p>
+            <a:r>
+              <a:rPr lang="en-US" dirty="0" smtClean="0"/>
+              <a:t>MS-SQL (Express)</a:t>
+            </a:r>
+          </a:p>
+          <a:p>
+            <a:endParaRPr lang="en-US" dirty="0" smtClean="0"/>
+          </a:p>
+          <a:p>
+            <a:r>
+              <a:rPr lang="en-US" dirty="0" smtClean="0"/>
+              <a:t>Possibly Knockout.js</a:t>
+            </a:r>
+            <a:endParaRPr lang="en-US" dirty="0" smtClean="0"/>
           </a:p>
         </p:txBody>
       </p:sp>

</xml_diff>